<commit_message>
added gifs to presentation
</commit_message>
<xml_diff>
--- a/Presentations/First Presentation/midterm_presentation.pptx
+++ b/Presentations/First Presentation/midterm_presentation.pptx
@@ -10,7 +10,8 @@
     <p:sldId id="258" r:id="rId4"/>
     <p:sldId id="259" r:id="rId5"/>
     <p:sldId id="260" r:id="rId6"/>
-    <p:sldId id="261" r:id="rId7"/>
+    <p:sldId id="262" r:id="rId7"/>
+    <p:sldId id="261" r:id="rId8"/>
   </p:sldIdLst>
   <p:sldSz cx="12192000" cy="6858000"/>
   <p:notesSz cx="6858000" cy="9144000"/>
@@ -109,7 +110,144 @@
       </a:defRPr>
     </a:lvl9pPr>
   </p:defaultTextStyle>
+  <p:extLst>
+    <p:ext uri="{EFAFB233-063F-42B5-8137-9DF3F51BA10A}">
+      <p15:sldGuideLst xmlns:p15="http://schemas.microsoft.com/office/powerpoint/2012/main"/>
+    </p:ext>
+  </p:extLst>
 </p:presentation>
+</file>
+
+<file path=ppt/revisionInfo.xml><?xml version="1.0" encoding="utf-8"?>
+<p1510:revInfo xmlns:a="http://schemas.openxmlformats.org/drawingml/2006/main" xmlns:r="http://schemas.openxmlformats.org/officeDocument/2006/relationships" xmlns:p1510="http://schemas.microsoft.com/office/powerpoint/2015/10/main">
+  <p1510:revLst>
+    <p1510:client id="{7AC47B72-C765-4CFF-BD64-A38374DB7393}" v="2" dt="2022-12-08T11:34:11.424"/>
+  </p1510:revLst>
+</p1510:revInfo>
+</file>
+
+<file path=ppt/changesInfos/changesInfo1.xml><?xml version="1.0" encoding="utf-8"?>
+<pc:chgInfo xmlns:a="http://schemas.openxmlformats.org/drawingml/2006/main" xmlns:r="http://schemas.openxmlformats.org/officeDocument/2006/relationships" xmlns:ac="http://schemas.microsoft.com/office/drawing/2013/main/command" xmlns:pc="http://schemas.microsoft.com/office/powerpoint/2013/main/command">
+  <pc:docChgLst>
+    <pc:chgData name="Fabian Blasch" userId="91b698f49155f71e" providerId="LiveId" clId="{7AC47B72-C765-4CFF-BD64-A38374DB7393}"/>
+    <pc:docChg chg="custSel addSld modSld">
+      <pc:chgData name="Fabian Blasch" userId="91b698f49155f71e" providerId="LiveId" clId="{7AC47B72-C765-4CFF-BD64-A38374DB7393}" dt="2022-12-08T11:36:52.316" v="153" actId="1076"/>
+      <pc:docMkLst>
+        <pc:docMk/>
+      </pc:docMkLst>
+      <pc:sldChg chg="addSp delSp modSp mod">
+        <pc:chgData name="Fabian Blasch" userId="91b698f49155f71e" providerId="LiveId" clId="{7AC47B72-C765-4CFF-BD64-A38374DB7393}" dt="2022-12-08T11:20:40.055" v="61" actId="20577"/>
+        <pc:sldMkLst>
+          <pc:docMk/>
+          <pc:sldMk cId="1115239791" sldId="260"/>
+        </pc:sldMkLst>
+        <pc:spChg chg="mod">
+          <ac:chgData name="Fabian Blasch" userId="91b698f49155f71e" providerId="LiveId" clId="{7AC47B72-C765-4CFF-BD64-A38374DB7393}" dt="2022-12-08T11:20:40.055" v="61" actId="20577"/>
+          <ac:spMkLst>
+            <pc:docMk/>
+            <pc:sldMk cId="1115239791" sldId="260"/>
+            <ac:spMk id="2" creationId="{2A8F8DD3-63A6-3B13-E68E-D035184C8DA5}"/>
+          </ac:spMkLst>
+        </pc:spChg>
+        <pc:spChg chg="add del mod">
+          <ac:chgData name="Fabian Blasch" userId="91b698f49155f71e" providerId="LiveId" clId="{7AC47B72-C765-4CFF-BD64-A38374DB7393}" dt="2022-12-08T11:19:07.641" v="6" actId="931"/>
+          <ac:spMkLst>
+            <pc:docMk/>
+            <pc:sldMk cId="1115239791" sldId="260"/>
+            <ac:spMk id="4" creationId="{62296B21-EEEA-F327-1881-CC5513D6EB1A}"/>
+          </ac:spMkLst>
+        </pc:spChg>
+        <pc:picChg chg="add mod">
+          <ac:chgData name="Fabian Blasch" userId="91b698f49155f71e" providerId="LiveId" clId="{7AC47B72-C765-4CFF-BD64-A38374DB7393}" dt="2022-12-08T11:19:54.703" v="15" actId="1076"/>
+          <ac:picMkLst>
+            <pc:docMk/>
+            <pc:sldMk cId="1115239791" sldId="260"/>
+            <ac:picMk id="6" creationId="{4A9A1D75-DD23-B93B-B160-7A8A272651A1}"/>
+          </ac:picMkLst>
+        </pc:picChg>
+        <pc:picChg chg="del">
+          <ac:chgData name="Fabian Blasch" userId="91b698f49155f71e" providerId="LiveId" clId="{7AC47B72-C765-4CFF-BD64-A38374DB7393}" dt="2022-12-08T11:18:34.191" v="2" actId="478"/>
+          <ac:picMkLst>
+            <pc:docMk/>
+            <pc:sldMk cId="1115239791" sldId="260"/>
+            <ac:picMk id="7" creationId="{9521CA76-D2FC-FD89-E92F-E3FD781CDF8C}"/>
+          </ac:picMkLst>
+        </pc:picChg>
+        <pc:picChg chg="del mod">
+          <ac:chgData name="Fabian Blasch" userId="91b698f49155f71e" providerId="LiveId" clId="{7AC47B72-C765-4CFF-BD64-A38374DB7393}" dt="2022-12-08T11:18:32.311" v="1" actId="478"/>
+          <ac:picMkLst>
+            <pc:docMk/>
+            <pc:sldMk cId="1115239791" sldId="260"/>
+            <ac:picMk id="9" creationId="{82D1CDFC-A0B2-1B4C-7055-7A793A94F19A}"/>
+          </ac:picMkLst>
+        </pc:picChg>
+        <pc:picChg chg="add mod">
+          <ac:chgData name="Fabian Blasch" userId="91b698f49155f71e" providerId="LiveId" clId="{7AC47B72-C765-4CFF-BD64-A38374DB7393}" dt="2022-12-08T11:20:00.724" v="18" actId="1076"/>
+          <ac:picMkLst>
+            <pc:docMk/>
+            <pc:sldMk cId="1115239791" sldId="260"/>
+            <ac:picMk id="10" creationId="{8B254128-88B0-A85E-31ED-EB4915134844}"/>
+          </ac:picMkLst>
+        </pc:picChg>
+      </pc:sldChg>
+      <pc:sldChg chg="addSp delSp modSp new mod">
+        <pc:chgData name="Fabian Blasch" userId="91b698f49155f71e" providerId="LiveId" clId="{7AC47B72-C765-4CFF-BD64-A38374DB7393}" dt="2022-12-08T11:36:52.316" v="153" actId="1076"/>
+        <pc:sldMkLst>
+          <pc:docMk/>
+          <pc:sldMk cId="3681023647" sldId="262"/>
+        </pc:sldMkLst>
+        <pc:spChg chg="mod">
+          <ac:chgData name="Fabian Blasch" userId="91b698f49155f71e" providerId="LiveId" clId="{7AC47B72-C765-4CFF-BD64-A38374DB7393}" dt="2022-12-08T11:35:16.670" v="135" actId="27636"/>
+          <ac:spMkLst>
+            <pc:docMk/>
+            <pc:sldMk cId="3681023647" sldId="262"/>
+            <ac:spMk id="2" creationId="{DC37769C-68EF-9A16-5E91-B24068F361C9}"/>
+          </ac:spMkLst>
+        </pc:spChg>
+        <pc:spChg chg="del mod">
+          <ac:chgData name="Fabian Blasch" userId="91b698f49155f71e" providerId="LiveId" clId="{7AC47B72-C765-4CFF-BD64-A38374DB7393}" dt="2022-12-08T11:34:11.424" v="103" actId="931"/>
+          <ac:spMkLst>
+            <pc:docMk/>
+            <pc:sldMk cId="3681023647" sldId="262"/>
+            <ac:spMk id="3" creationId="{903288DA-768A-D752-8D6B-B654D149E504}"/>
+          </ac:spMkLst>
+        </pc:spChg>
+        <pc:picChg chg="add mod">
+          <ac:chgData name="Fabian Blasch" userId="91b698f49155f71e" providerId="LiveId" clId="{7AC47B72-C765-4CFF-BD64-A38374DB7393}" dt="2022-12-08T11:36:52.316" v="153" actId="1076"/>
+          <ac:picMkLst>
+            <pc:docMk/>
+            <pc:sldMk cId="3681023647" sldId="262"/>
+            <ac:picMk id="5" creationId="{D76316F5-A838-6E95-1436-72DF1A107EE9}"/>
+          </ac:picMkLst>
+        </pc:picChg>
+        <pc:picChg chg="add mod">
+          <ac:chgData name="Fabian Blasch" userId="91b698f49155f71e" providerId="LiveId" clId="{7AC47B72-C765-4CFF-BD64-A38374DB7393}" dt="2022-12-08T11:36:52.316" v="153" actId="1076"/>
+          <ac:picMkLst>
+            <pc:docMk/>
+            <pc:sldMk cId="3681023647" sldId="262"/>
+            <ac:picMk id="7" creationId="{5DD166CD-E351-9B26-70A0-4BB200405238}"/>
+          </ac:picMkLst>
+        </pc:picChg>
+        <pc:picChg chg="add mod">
+          <ac:chgData name="Fabian Blasch" userId="91b698f49155f71e" providerId="LiveId" clId="{7AC47B72-C765-4CFF-BD64-A38374DB7393}" dt="2022-12-08T11:36:52.316" v="153" actId="1076"/>
+          <ac:picMkLst>
+            <pc:docMk/>
+            <pc:sldMk cId="3681023647" sldId="262"/>
+            <ac:picMk id="9" creationId="{8053750D-0D1D-54F5-4CE8-C1C811BBEE0B}"/>
+          </ac:picMkLst>
+        </pc:picChg>
+        <pc:picChg chg="add mod">
+          <ac:chgData name="Fabian Blasch" userId="91b698f49155f71e" providerId="LiveId" clId="{7AC47B72-C765-4CFF-BD64-A38374DB7393}" dt="2022-12-08T11:36:52.316" v="153" actId="1076"/>
+          <ac:picMkLst>
+            <pc:docMk/>
+            <pc:sldMk cId="3681023647" sldId="262"/>
+            <ac:picMk id="11" creationId="{2F00AB17-2E70-086E-7F28-F406FA958DC3}"/>
+          </ac:picMkLst>
+        </pc:picChg>
+      </pc:sldChg>
+    </pc:docChg>
+  </pc:docChgLst>
+</pc:chgInfo>
 </file>
 
 <file path=ppt/slideLayouts/slideLayout1.xml><?xml version="1.0" encoding="utf-8"?>
@@ -294,7 +432,7 @@
           <a:p>
             <a:fld id="{BEE95682-5D6A-47FC-87E3-D350DC45A65C}" type="datetimeFigureOut">
               <a:rPr lang="de-AT" smtClean="0"/>
-              <a:t>06.12.2022</a:t>
+              <a:t>08.12.2022</a:t>
             </a:fld>
             <a:endParaRPr lang="de-AT"/>
           </a:p>
@@ -348,7 +486,7 @@
           <a:p>
             <a:fld id="{6510C8EE-8F42-4D7D-A368-E9EFA8FE638A}" type="slidenum">
               <a:rPr lang="de-AT" smtClean="0"/>
-              <a:t>‹Nr.›</a:t>
+              <a:t>‹#›</a:t>
             </a:fld>
             <a:endParaRPr lang="de-AT"/>
           </a:p>
@@ -494,7 +632,7 @@
           <a:p>
             <a:fld id="{BEE95682-5D6A-47FC-87E3-D350DC45A65C}" type="datetimeFigureOut">
               <a:rPr lang="de-AT" smtClean="0"/>
-              <a:t>06.12.2022</a:t>
+              <a:t>08.12.2022</a:t>
             </a:fld>
             <a:endParaRPr lang="de-AT"/>
           </a:p>
@@ -548,7 +686,7 @@
           <a:p>
             <a:fld id="{6510C8EE-8F42-4D7D-A368-E9EFA8FE638A}" type="slidenum">
               <a:rPr lang="de-AT" smtClean="0"/>
-              <a:t>‹Nr.›</a:t>
+              <a:t>‹#›</a:t>
             </a:fld>
             <a:endParaRPr lang="de-AT"/>
           </a:p>
@@ -704,7 +842,7 @@
           <a:p>
             <a:fld id="{BEE95682-5D6A-47FC-87E3-D350DC45A65C}" type="datetimeFigureOut">
               <a:rPr lang="de-AT" smtClean="0"/>
-              <a:t>06.12.2022</a:t>
+              <a:t>08.12.2022</a:t>
             </a:fld>
             <a:endParaRPr lang="de-AT"/>
           </a:p>
@@ -758,7 +896,7 @@
           <a:p>
             <a:fld id="{6510C8EE-8F42-4D7D-A368-E9EFA8FE638A}" type="slidenum">
               <a:rPr lang="de-AT" smtClean="0"/>
-              <a:t>‹Nr.›</a:t>
+              <a:t>‹#›</a:t>
             </a:fld>
             <a:endParaRPr lang="de-AT"/>
           </a:p>
@@ -973,7 +1111,7 @@
           <a:p>
             <a:fld id="{BEE95682-5D6A-47FC-87E3-D350DC45A65C}" type="datetimeFigureOut">
               <a:rPr lang="de-AT" smtClean="0"/>
-              <a:t>06.12.2022</a:t>
+              <a:t>08.12.2022</a:t>
             </a:fld>
             <a:endParaRPr lang="de-AT"/>
           </a:p>
@@ -1027,7 +1165,7 @@
           <a:p>
             <a:fld id="{6510C8EE-8F42-4D7D-A368-E9EFA8FE638A}" type="slidenum">
               <a:rPr lang="de-AT" smtClean="0"/>
-              <a:t>‹Nr.›</a:t>
+              <a:t>‹#›</a:t>
             </a:fld>
             <a:endParaRPr lang="de-AT"/>
           </a:p>
@@ -1249,7 +1387,7 @@
           <a:p>
             <a:fld id="{BEE95682-5D6A-47FC-87E3-D350DC45A65C}" type="datetimeFigureOut">
               <a:rPr lang="de-AT" smtClean="0"/>
-              <a:t>06.12.2022</a:t>
+              <a:t>08.12.2022</a:t>
             </a:fld>
             <a:endParaRPr lang="de-AT"/>
           </a:p>
@@ -1303,7 +1441,7 @@
           <a:p>
             <a:fld id="{6510C8EE-8F42-4D7D-A368-E9EFA8FE638A}" type="slidenum">
               <a:rPr lang="de-AT" smtClean="0"/>
-              <a:t>‹Nr.›</a:t>
+              <a:t>‹#›</a:t>
             </a:fld>
             <a:endParaRPr lang="de-AT"/>
           </a:p>
@@ -1517,7 +1655,7 @@
           <a:p>
             <a:fld id="{BEE95682-5D6A-47FC-87E3-D350DC45A65C}" type="datetimeFigureOut">
               <a:rPr lang="de-AT" smtClean="0"/>
-              <a:t>06.12.2022</a:t>
+              <a:t>08.12.2022</a:t>
             </a:fld>
             <a:endParaRPr lang="de-AT"/>
           </a:p>
@@ -1571,7 +1709,7 @@
           <a:p>
             <a:fld id="{6510C8EE-8F42-4D7D-A368-E9EFA8FE638A}" type="slidenum">
               <a:rPr lang="de-AT" smtClean="0"/>
-              <a:t>‹Nr.›</a:t>
+              <a:t>‹#›</a:t>
             </a:fld>
             <a:endParaRPr lang="de-AT"/>
           </a:p>
@@ -1932,7 +2070,7 @@
           <a:p>
             <a:fld id="{BEE95682-5D6A-47FC-87E3-D350DC45A65C}" type="datetimeFigureOut">
               <a:rPr lang="de-AT" smtClean="0"/>
-              <a:t>06.12.2022</a:t>
+              <a:t>08.12.2022</a:t>
             </a:fld>
             <a:endParaRPr lang="de-AT"/>
           </a:p>
@@ -1986,7 +2124,7 @@
           <a:p>
             <a:fld id="{6510C8EE-8F42-4D7D-A368-E9EFA8FE638A}" type="slidenum">
               <a:rPr lang="de-AT" smtClean="0"/>
-              <a:t>‹Nr.›</a:t>
+              <a:t>‹#›</a:t>
             </a:fld>
             <a:endParaRPr lang="de-AT"/>
           </a:p>
@@ -2074,7 +2212,7 @@
           <a:p>
             <a:fld id="{BEE95682-5D6A-47FC-87E3-D350DC45A65C}" type="datetimeFigureOut">
               <a:rPr lang="de-AT" smtClean="0"/>
-              <a:t>06.12.2022</a:t>
+              <a:t>08.12.2022</a:t>
             </a:fld>
             <a:endParaRPr lang="de-AT"/>
           </a:p>
@@ -2128,7 +2266,7 @@
           <a:p>
             <a:fld id="{6510C8EE-8F42-4D7D-A368-E9EFA8FE638A}" type="slidenum">
               <a:rPr lang="de-AT" smtClean="0"/>
-              <a:t>‹Nr.›</a:t>
+              <a:t>‹#›</a:t>
             </a:fld>
             <a:endParaRPr lang="de-AT"/>
           </a:p>
@@ -2187,7 +2325,7 @@
           <a:p>
             <a:fld id="{BEE95682-5D6A-47FC-87E3-D350DC45A65C}" type="datetimeFigureOut">
               <a:rPr lang="de-AT" smtClean="0"/>
-              <a:t>06.12.2022</a:t>
+              <a:t>08.12.2022</a:t>
             </a:fld>
             <a:endParaRPr lang="de-AT"/>
           </a:p>
@@ -2241,7 +2379,7 @@
           <a:p>
             <a:fld id="{6510C8EE-8F42-4D7D-A368-E9EFA8FE638A}" type="slidenum">
               <a:rPr lang="de-AT" smtClean="0"/>
-              <a:t>‹Nr.›</a:t>
+              <a:t>‹#›</a:t>
             </a:fld>
             <a:endParaRPr lang="de-AT"/>
           </a:p>
@@ -2500,7 +2638,7 @@
           <a:p>
             <a:fld id="{BEE95682-5D6A-47FC-87E3-D350DC45A65C}" type="datetimeFigureOut">
               <a:rPr lang="de-AT" smtClean="0"/>
-              <a:t>06.12.2022</a:t>
+              <a:t>08.12.2022</a:t>
             </a:fld>
             <a:endParaRPr lang="de-AT"/>
           </a:p>
@@ -2554,7 +2692,7 @@
           <a:p>
             <a:fld id="{6510C8EE-8F42-4D7D-A368-E9EFA8FE638A}" type="slidenum">
               <a:rPr lang="de-AT" smtClean="0"/>
-              <a:t>‹Nr.›</a:t>
+              <a:t>‹#›</a:t>
             </a:fld>
             <a:endParaRPr lang="de-AT"/>
           </a:p>
@@ -2789,7 +2927,7 @@
           <a:p>
             <a:fld id="{BEE95682-5D6A-47FC-87E3-D350DC45A65C}" type="datetimeFigureOut">
               <a:rPr lang="de-AT" smtClean="0"/>
-              <a:t>06.12.2022</a:t>
+              <a:t>08.12.2022</a:t>
             </a:fld>
             <a:endParaRPr lang="de-AT"/>
           </a:p>
@@ -2843,7 +2981,7 @@
           <a:p>
             <a:fld id="{6510C8EE-8F42-4D7D-A368-E9EFA8FE638A}" type="slidenum">
               <a:rPr lang="de-AT" smtClean="0"/>
-              <a:t>‹Nr.›</a:t>
+              <a:t>‹#›</a:t>
             </a:fld>
             <a:endParaRPr lang="de-AT"/>
           </a:p>
@@ -3032,7 +3170,7 @@
           <a:p>
             <a:fld id="{BEE95682-5D6A-47FC-87E3-D350DC45A65C}" type="datetimeFigureOut">
               <a:rPr lang="de-AT" smtClean="0"/>
-              <a:t>06.12.2022</a:t>
+              <a:t>08.12.2022</a:t>
             </a:fld>
             <a:endParaRPr lang="de-AT"/>
           </a:p>
@@ -3122,7 +3260,7 @@
           <a:p>
             <a:fld id="{6510C8EE-8F42-4D7D-A368-E9EFA8FE638A}" type="slidenum">
               <a:rPr lang="de-AT" smtClean="0"/>
-              <a:t>‹Nr.›</a:t>
+              <a:t>‹#›</a:t>
             </a:fld>
             <a:endParaRPr lang="de-AT"/>
           </a:p>
@@ -3810,33 +3948,39 @@
             <p:ph type="title"/>
           </p:nvPr>
         </p:nvSpPr>
-        <p:spPr/>
-        <p:txBody>
-          <a:bodyPr/>
-          <a:lstStyle/>
-          <a:p>
+        <p:spPr>
+          <a:xfrm>
+            <a:off x="838200" y="365125"/>
+            <a:ext cx="10515600" cy="1069699"/>
+          </a:xfrm>
+        </p:spPr>
+        <p:txBody>
+          <a:bodyPr>
+            <a:normAutofit/>
+          </a:bodyPr>
+          <a:lstStyle/>
+          <a:p>
+            <a:r>
+              <a:rPr lang="de-AT" dirty="0"/>
+              <a:t>Health Care </a:t>
+            </a:r>
             <a:r>
               <a:rPr lang="de-AT" dirty="0" err="1"/>
-              <a:t>Some</a:t>
+              <a:t>Expenditure</a:t>
             </a:r>
             <a:r>
               <a:rPr lang="de-AT" dirty="0"/>
               <a:t> </a:t>
             </a:r>
-            <a:r>
-              <a:rPr lang="de-AT" dirty="0" err="1"/>
-              <a:t>Insights</a:t>
-            </a:r>
-            <a:endParaRPr lang="de-AT" dirty="0"/>
           </a:p>
         </p:txBody>
       </p:sp>
       <p:pic>
         <p:nvPicPr>
-          <p:cNvPr id="7" name="Inhaltsplatzhalter 6" descr="Ein Bild, das Karte enthält.&#10;&#10;Automatisch generierte Beschreibung">
-            <a:extLst>
-              <a:ext uri="{FF2B5EF4-FFF2-40B4-BE49-F238E27FC236}">
-                <a16:creationId xmlns:a16="http://schemas.microsoft.com/office/drawing/2014/main" id="{9521CA76-D2FC-FD89-E92F-E3FD781CDF8C}"/>
+          <p:cNvPr id="6" name="Content Placeholder 5" descr="Map&#10;&#10;Description automatically generated">
+            <a:extLst>
+              <a:ext uri="{FF2B5EF4-FFF2-40B4-BE49-F238E27FC236}">
+                <a16:creationId xmlns:a16="http://schemas.microsoft.com/office/drawing/2014/main" id="{4A9A1D75-DD23-B93B-B160-7A8A272651A1}"/>
               </a:ext>
             </a:extLst>
           </p:cNvPr>
@@ -3861,17 +4005,17 @@
         </p:blipFill>
         <p:spPr>
           <a:xfrm>
-            <a:off x="6453120" y="1845003"/>
-            <a:ext cx="4846892" cy="3231261"/>
+            <a:off x="399603" y="1838584"/>
+            <a:ext cx="5466503" cy="3584592"/>
           </a:xfrm>
         </p:spPr>
       </p:pic>
       <p:pic>
         <p:nvPicPr>
-          <p:cNvPr id="9" name="Grafik 8" descr="Ein Bild, das Karte enthält.&#10;&#10;Automatisch generierte Beschreibung">
-            <a:extLst>
-              <a:ext uri="{FF2B5EF4-FFF2-40B4-BE49-F238E27FC236}">
-                <a16:creationId xmlns:a16="http://schemas.microsoft.com/office/drawing/2014/main" id="{82D1CDFC-A0B2-1B4C-7055-7A793A94F19A}"/>
+          <p:cNvPr id="10" name="Picture 9" descr="Map&#10;&#10;Description automatically generated">
+            <a:extLst>
+              <a:ext uri="{FF2B5EF4-FFF2-40B4-BE49-F238E27FC236}">
+                <a16:creationId xmlns:a16="http://schemas.microsoft.com/office/drawing/2014/main" id="{8B254128-88B0-A85E-31ED-EB4915134844}"/>
               </a:ext>
             </a:extLst>
           </p:cNvPr>
@@ -3894,8 +4038,8 @@
         </p:blipFill>
         <p:spPr>
           <a:xfrm>
-            <a:off x="838200" y="1845003"/>
-            <a:ext cx="4831189" cy="3167993"/>
+            <a:off x="6325894" y="1838584"/>
+            <a:ext cx="5466503" cy="3584592"/>
           </a:xfrm>
           <a:prstGeom prst="rect">
             <a:avLst/>
@@ -3916,6 +4060,215 @@
 </file>
 
 <file path=ppt/slides/slide6.xml><?xml version="1.0" encoding="utf-8"?>
+<p:sld xmlns:a="http://schemas.openxmlformats.org/drawingml/2006/main" xmlns:r="http://schemas.openxmlformats.org/officeDocument/2006/relationships" xmlns:p="http://schemas.openxmlformats.org/presentationml/2006/main">
+  <p:cSld>
+    <p:spTree>
+      <p:nvGrpSpPr>
+        <p:cNvPr id="1" name=""/>
+        <p:cNvGrpSpPr/>
+        <p:nvPr/>
+      </p:nvGrpSpPr>
+      <p:grpSpPr>
+        <a:xfrm>
+          <a:off x="0" y="0"/>
+          <a:ext cx="0" cy="0"/>
+          <a:chOff x="0" y="0"/>
+          <a:chExt cx="0" cy="0"/>
+        </a:xfrm>
+      </p:grpSpPr>
+      <p:sp>
+        <p:nvSpPr>
+          <p:cNvPr id="2" name="Title 1">
+            <a:extLst>
+              <a:ext uri="{FF2B5EF4-FFF2-40B4-BE49-F238E27FC236}">
+                <a16:creationId xmlns:a16="http://schemas.microsoft.com/office/drawing/2014/main" id="{DC37769C-68EF-9A16-5E91-B24068F361C9}"/>
+              </a:ext>
+            </a:extLst>
+          </p:cNvPr>
+          <p:cNvSpPr>
+            <a:spLocks noGrp="1"/>
+          </p:cNvSpPr>
+          <p:nvPr>
+            <p:ph type="title"/>
+          </p:nvPr>
+        </p:nvSpPr>
+        <p:spPr>
+          <a:xfrm>
+            <a:off x="838200" y="188536"/>
+            <a:ext cx="10515600" cy="546755"/>
+          </a:xfrm>
+        </p:spPr>
+        <p:txBody>
+          <a:bodyPr>
+            <a:normAutofit fontScale="90000"/>
+          </a:bodyPr>
+          <a:lstStyle/>
+          <a:p>
+            <a:r>
+              <a:rPr lang="de-AT" dirty="0"/>
+              <a:t>Air Pollution Variables</a:t>
+            </a:r>
+            <a:endParaRPr lang="en-US" dirty="0"/>
+          </a:p>
+        </p:txBody>
+      </p:sp>
+      <p:pic>
+        <p:nvPicPr>
+          <p:cNvPr id="5" name="Content Placeholder 4" descr="Map&#10;&#10;Description automatically generated">
+            <a:extLst>
+              <a:ext uri="{FF2B5EF4-FFF2-40B4-BE49-F238E27FC236}">
+                <a16:creationId xmlns:a16="http://schemas.microsoft.com/office/drawing/2014/main" id="{D76316F5-A838-6E95-1436-72DF1A107EE9}"/>
+              </a:ext>
+            </a:extLst>
+          </p:cNvPr>
+          <p:cNvPicPr>
+            <a:picLocks noGrp="1" noChangeAspect="1"/>
+          </p:cNvPicPr>
+          <p:nvPr>
+            <p:ph idx="1"/>
+          </p:nvPr>
+        </p:nvPicPr>
+        <p:blipFill>
+          <a:blip r:embed="rId2">
+            <a:extLst>
+              <a:ext uri="{28A0092B-C50C-407E-A947-70E740481C1C}">
+                <a14:useLocalDpi xmlns:a14="http://schemas.microsoft.com/office/drawing/2010/main" val="0"/>
+              </a:ext>
+            </a:extLst>
+          </a:blip>
+          <a:stretch>
+            <a:fillRect/>
+          </a:stretch>
+        </p:blipFill>
+        <p:spPr>
+          <a:xfrm>
+            <a:off x="1655445" y="833679"/>
+            <a:ext cx="4223661" cy="2769614"/>
+          </a:xfrm>
+        </p:spPr>
+      </p:pic>
+      <p:pic>
+        <p:nvPicPr>
+          <p:cNvPr id="7" name="Picture 6" descr="Map&#10;&#10;Description automatically generated">
+            <a:extLst>
+              <a:ext uri="{FF2B5EF4-FFF2-40B4-BE49-F238E27FC236}">
+                <a16:creationId xmlns:a16="http://schemas.microsoft.com/office/drawing/2014/main" id="{5DD166CD-E351-9B26-70A0-4BB200405238}"/>
+              </a:ext>
+            </a:extLst>
+          </p:cNvPr>
+          <p:cNvPicPr>
+            <a:picLocks noChangeAspect="1"/>
+          </p:cNvPicPr>
+          <p:nvPr/>
+        </p:nvPicPr>
+        <p:blipFill>
+          <a:blip r:embed="rId3">
+            <a:extLst>
+              <a:ext uri="{28A0092B-C50C-407E-A947-70E740481C1C}">
+                <a14:useLocalDpi xmlns:a14="http://schemas.microsoft.com/office/drawing/2010/main" val="0"/>
+              </a:ext>
+            </a:extLst>
+          </a:blip>
+          <a:stretch>
+            <a:fillRect/>
+          </a:stretch>
+        </p:blipFill>
+        <p:spPr>
+          <a:xfrm>
+            <a:off x="1655445" y="3814802"/>
+            <a:ext cx="4223661" cy="2769614"/>
+          </a:xfrm>
+          <a:prstGeom prst="rect">
+            <a:avLst/>
+          </a:prstGeom>
+        </p:spPr>
+      </p:pic>
+      <p:pic>
+        <p:nvPicPr>
+          <p:cNvPr id="9" name="Picture 8" descr="Map&#10;&#10;Description automatically generated">
+            <a:extLst>
+              <a:ext uri="{FF2B5EF4-FFF2-40B4-BE49-F238E27FC236}">
+                <a16:creationId xmlns:a16="http://schemas.microsoft.com/office/drawing/2014/main" id="{8053750D-0D1D-54F5-4CE8-C1C811BBEE0B}"/>
+              </a:ext>
+            </a:extLst>
+          </p:cNvPr>
+          <p:cNvPicPr>
+            <a:picLocks noChangeAspect="1"/>
+          </p:cNvPicPr>
+          <p:nvPr/>
+        </p:nvPicPr>
+        <p:blipFill>
+          <a:blip r:embed="rId4">
+            <a:extLst>
+              <a:ext uri="{28A0092B-C50C-407E-A947-70E740481C1C}">
+                <a14:useLocalDpi xmlns:a14="http://schemas.microsoft.com/office/drawing/2010/main" val="0"/>
+              </a:ext>
+            </a:extLst>
+          </a:blip>
+          <a:stretch>
+            <a:fillRect/>
+          </a:stretch>
+        </p:blipFill>
+        <p:spPr>
+          <a:xfrm>
+            <a:off x="6206849" y="833680"/>
+            <a:ext cx="4223662" cy="2769614"/>
+          </a:xfrm>
+          <a:prstGeom prst="rect">
+            <a:avLst/>
+          </a:prstGeom>
+        </p:spPr>
+      </p:pic>
+      <p:pic>
+        <p:nvPicPr>
+          <p:cNvPr id="11" name="Picture 10" descr="Map&#10;&#10;Description automatically generated">
+            <a:extLst>
+              <a:ext uri="{FF2B5EF4-FFF2-40B4-BE49-F238E27FC236}">
+                <a16:creationId xmlns:a16="http://schemas.microsoft.com/office/drawing/2014/main" id="{2F00AB17-2E70-086E-7F28-F406FA958DC3}"/>
+              </a:ext>
+            </a:extLst>
+          </p:cNvPr>
+          <p:cNvPicPr>
+            <a:picLocks noChangeAspect="1"/>
+          </p:cNvPicPr>
+          <p:nvPr/>
+        </p:nvPicPr>
+        <p:blipFill>
+          <a:blip r:embed="rId5">
+            <a:extLst>
+              <a:ext uri="{28A0092B-C50C-407E-A947-70E740481C1C}">
+                <a14:useLocalDpi xmlns:a14="http://schemas.microsoft.com/office/drawing/2010/main" val="0"/>
+              </a:ext>
+            </a:extLst>
+          </a:blip>
+          <a:stretch>
+            <a:fillRect/>
+          </a:stretch>
+        </p:blipFill>
+        <p:spPr>
+          <a:xfrm>
+            <a:off x="6206849" y="3842875"/>
+            <a:ext cx="4180850" cy="2741541"/>
+          </a:xfrm>
+          <a:prstGeom prst="rect">
+            <a:avLst/>
+          </a:prstGeom>
+        </p:spPr>
+      </p:pic>
+    </p:spTree>
+    <p:extLst>
+      <p:ext uri="{BB962C8B-B14F-4D97-AF65-F5344CB8AC3E}">
+        <p14:creationId xmlns:p14="http://schemas.microsoft.com/office/powerpoint/2010/main" val="3681023647"/>
+      </p:ext>
+    </p:extLst>
+  </p:cSld>
+  <p:clrMapOvr>
+    <a:masterClrMapping/>
+  </p:clrMapOvr>
+</p:sld>
+</file>
+
+<file path=ppt/slides/slide7.xml><?xml version="1.0" encoding="utf-8"?>
 <p:sld xmlns:a="http://schemas.openxmlformats.org/drawingml/2006/main" xmlns:r="http://schemas.openxmlformats.org/officeDocument/2006/relationships" xmlns:p="http://schemas.openxmlformats.org/presentationml/2006/main">
   <p:cSld>
     <p:spTree>

</xml_diff>